<commit_message>
Haridharshini R  ,assignment -2
this is assignment about python code for temperature and humidity values and condition to continuously detect alarm in case of high temperature.
</commit_message>
<xml_diff>
--- a/Assignment-2.pptx
+++ b/Assignment-2.pptx
@@ -104,6 +104,11 @@
       </a:defRPr>
     </a:lvl9pPr>
   </p:defaultTextStyle>
+  <p:extLst>
+    <p:ext uri="{EFAFB233-063F-42B5-8137-9DF3F51BA10A}">
+      <p15:sldGuideLst xmlns:p15="http://schemas.microsoft.com/office/powerpoint/2012/main"/>
+    </p:ext>
+  </p:extLst>
 </p:presentation>
 </file>
 
@@ -238,8 +243,7 @@
           <a:p>
             <a:fld id="{98C2204E-7DD4-40E6-BC6B-54E457881367}" type="datetimeFigureOut">
               <a:rPr lang="zh-CN" altLang="en-US" smtClean="0"/>
-              <a:pPr/>
-              <a:t>2022/9/22</a:t>
+              <a:t>2022/9/23</a:t>
             </a:fld>
             <a:endParaRPr lang="zh-CN" altLang="en-US"/>
           </a:p>
@@ -281,7 +285,6 @@
           <a:p>
             <a:fld id="{CDF91D2C-8D54-4FB7-92D2-9073743D5A95}" type="slidenum">
               <a:rPr lang="zh-CN" altLang="en-US" smtClean="0"/>
-              <a:pPr/>
               <a:t>‹#›</a:t>
             </a:fld>
             <a:endParaRPr lang="zh-CN" altLang="en-US"/>
@@ -291,7 +294,7 @@
     </p:spTree>
     <p:extLst>
       <p:ext uri="{BB962C8B-B14F-4D97-AF65-F5344CB8AC3E}">
-        <p14:creationId xmlns:p14="http://schemas.microsoft.com/office/powerpoint/2010/main" xmlns="" val="3230261121"/>
+        <p14:creationId xmlns:p14="http://schemas.microsoft.com/office/powerpoint/2010/main" val="3230261121"/>
       </p:ext>
     </p:extLst>
   </p:cSld>
@@ -410,8 +413,7 @@
           <a:p>
             <a:fld id="{98C2204E-7DD4-40E6-BC6B-54E457881367}" type="datetimeFigureOut">
               <a:rPr lang="zh-CN" altLang="en-US" smtClean="0"/>
-              <a:pPr/>
-              <a:t>2022/9/22</a:t>
+              <a:t>2022/9/23</a:t>
             </a:fld>
             <a:endParaRPr lang="zh-CN" altLang="en-US"/>
           </a:p>
@@ -453,7 +455,6 @@
           <a:p>
             <a:fld id="{CDF91D2C-8D54-4FB7-92D2-9073743D5A95}" type="slidenum">
               <a:rPr lang="zh-CN" altLang="en-US" smtClean="0"/>
-              <a:pPr/>
               <a:t>‹#›</a:t>
             </a:fld>
             <a:endParaRPr lang="zh-CN" altLang="en-US"/>
@@ -463,7 +464,7 @@
     </p:spTree>
     <p:extLst>
       <p:ext uri="{BB962C8B-B14F-4D97-AF65-F5344CB8AC3E}">
-        <p14:creationId xmlns:p14="http://schemas.microsoft.com/office/powerpoint/2010/main" xmlns="" val="904070980"/>
+        <p14:creationId xmlns:p14="http://schemas.microsoft.com/office/powerpoint/2010/main" val="904070980"/>
       </p:ext>
     </p:extLst>
   </p:cSld>
@@ -592,8 +593,7 @@
           <a:p>
             <a:fld id="{98C2204E-7DD4-40E6-BC6B-54E457881367}" type="datetimeFigureOut">
               <a:rPr lang="zh-CN" altLang="en-US" smtClean="0"/>
-              <a:pPr/>
-              <a:t>2022/9/22</a:t>
+              <a:t>2022/9/23</a:t>
             </a:fld>
             <a:endParaRPr lang="zh-CN" altLang="en-US"/>
           </a:p>
@@ -635,7 +635,6 @@
           <a:p>
             <a:fld id="{CDF91D2C-8D54-4FB7-92D2-9073743D5A95}" type="slidenum">
               <a:rPr lang="zh-CN" altLang="en-US" smtClean="0"/>
-              <a:pPr/>
               <a:t>‹#›</a:t>
             </a:fld>
             <a:endParaRPr lang="zh-CN" altLang="en-US"/>
@@ -645,7 +644,7 @@
     </p:spTree>
     <p:extLst>
       <p:ext uri="{BB962C8B-B14F-4D97-AF65-F5344CB8AC3E}">
-        <p14:creationId xmlns:p14="http://schemas.microsoft.com/office/powerpoint/2010/main" xmlns="" val="2672247020"/>
+        <p14:creationId xmlns:p14="http://schemas.microsoft.com/office/powerpoint/2010/main" val="2672247020"/>
       </p:ext>
     </p:extLst>
   </p:cSld>
@@ -764,8 +763,7 @@
           <a:p>
             <a:fld id="{98C2204E-7DD4-40E6-BC6B-54E457881367}" type="datetimeFigureOut">
               <a:rPr lang="zh-CN" altLang="en-US" smtClean="0"/>
-              <a:pPr/>
-              <a:t>2022/9/22</a:t>
+              <a:t>2022/9/23</a:t>
             </a:fld>
             <a:endParaRPr lang="zh-CN" altLang="en-US"/>
           </a:p>
@@ -807,7 +805,6 @@
           <a:p>
             <a:fld id="{CDF91D2C-8D54-4FB7-92D2-9073743D5A95}" type="slidenum">
               <a:rPr lang="zh-CN" altLang="en-US" smtClean="0"/>
-              <a:pPr/>
               <a:t>‹#›</a:t>
             </a:fld>
             <a:endParaRPr lang="zh-CN" altLang="en-US"/>
@@ -817,7 +814,7 @@
     </p:spTree>
     <p:extLst>
       <p:ext uri="{BB962C8B-B14F-4D97-AF65-F5344CB8AC3E}">
-        <p14:creationId xmlns:p14="http://schemas.microsoft.com/office/powerpoint/2010/main" xmlns="" val="3080504138"/>
+        <p14:creationId xmlns:p14="http://schemas.microsoft.com/office/powerpoint/2010/main" val="3080504138"/>
       </p:ext>
     </p:extLst>
   </p:cSld>
@@ -1012,8 +1009,7 @@
           <a:p>
             <a:fld id="{98C2204E-7DD4-40E6-BC6B-54E457881367}" type="datetimeFigureOut">
               <a:rPr lang="zh-CN" altLang="en-US" smtClean="0"/>
-              <a:pPr/>
-              <a:t>2022/9/22</a:t>
+              <a:t>2022/9/23</a:t>
             </a:fld>
             <a:endParaRPr lang="zh-CN" altLang="en-US"/>
           </a:p>
@@ -1055,7 +1051,6 @@
           <a:p>
             <a:fld id="{CDF91D2C-8D54-4FB7-92D2-9073743D5A95}" type="slidenum">
               <a:rPr lang="zh-CN" altLang="en-US" smtClean="0"/>
-              <a:pPr/>
               <a:t>‹#›</a:t>
             </a:fld>
             <a:endParaRPr lang="zh-CN" altLang="en-US"/>
@@ -1065,7 +1060,7 @@
     </p:spTree>
     <p:extLst>
       <p:ext uri="{BB962C8B-B14F-4D97-AF65-F5344CB8AC3E}">
-        <p14:creationId xmlns:p14="http://schemas.microsoft.com/office/powerpoint/2010/main" xmlns="" val="3430538879"/>
+        <p14:creationId xmlns:p14="http://schemas.microsoft.com/office/powerpoint/2010/main" val="3430538879"/>
       </p:ext>
     </p:extLst>
   </p:cSld>
@@ -1246,8 +1241,7 @@
           <a:p>
             <a:fld id="{98C2204E-7DD4-40E6-BC6B-54E457881367}" type="datetimeFigureOut">
               <a:rPr lang="zh-CN" altLang="en-US" smtClean="0"/>
-              <a:pPr/>
-              <a:t>2022/9/22</a:t>
+              <a:t>2022/9/23</a:t>
             </a:fld>
             <a:endParaRPr lang="zh-CN" altLang="en-US"/>
           </a:p>
@@ -1289,7 +1283,6 @@
           <a:p>
             <a:fld id="{CDF91D2C-8D54-4FB7-92D2-9073743D5A95}" type="slidenum">
               <a:rPr lang="zh-CN" altLang="en-US" smtClean="0"/>
-              <a:pPr/>
               <a:t>‹#›</a:t>
             </a:fld>
             <a:endParaRPr lang="zh-CN" altLang="en-US"/>
@@ -1299,7 +1292,7 @@
     </p:spTree>
     <p:extLst>
       <p:ext uri="{BB962C8B-B14F-4D97-AF65-F5344CB8AC3E}">
-        <p14:creationId xmlns:p14="http://schemas.microsoft.com/office/powerpoint/2010/main" xmlns="" val="2455271077"/>
+        <p14:creationId xmlns:p14="http://schemas.microsoft.com/office/powerpoint/2010/main" val="2455271077"/>
       </p:ext>
     </p:extLst>
   </p:cSld>
@@ -1615,8 +1608,7 @@
           <a:p>
             <a:fld id="{98C2204E-7DD4-40E6-BC6B-54E457881367}" type="datetimeFigureOut">
               <a:rPr lang="zh-CN" altLang="en-US" smtClean="0"/>
-              <a:pPr/>
-              <a:t>2022/9/22</a:t>
+              <a:t>2022/9/23</a:t>
             </a:fld>
             <a:endParaRPr lang="zh-CN" altLang="en-US"/>
           </a:p>
@@ -1658,7 +1650,6 @@
           <a:p>
             <a:fld id="{CDF91D2C-8D54-4FB7-92D2-9073743D5A95}" type="slidenum">
               <a:rPr lang="zh-CN" altLang="en-US" smtClean="0"/>
-              <a:pPr/>
               <a:t>‹#›</a:t>
             </a:fld>
             <a:endParaRPr lang="zh-CN" altLang="en-US"/>
@@ -1668,7 +1659,7 @@
     </p:spTree>
     <p:extLst>
       <p:ext uri="{BB962C8B-B14F-4D97-AF65-F5344CB8AC3E}">
-        <p14:creationId xmlns:p14="http://schemas.microsoft.com/office/powerpoint/2010/main" xmlns="" val="2783812611"/>
+        <p14:creationId xmlns:p14="http://schemas.microsoft.com/office/powerpoint/2010/main" val="2783812611"/>
       </p:ext>
     </p:extLst>
   </p:cSld>
@@ -1735,8 +1726,7 @@
           <a:p>
             <a:fld id="{98C2204E-7DD4-40E6-BC6B-54E457881367}" type="datetimeFigureOut">
               <a:rPr lang="zh-CN" altLang="en-US" smtClean="0"/>
-              <a:pPr/>
-              <a:t>2022/9/22</a:t>
+              <a:t>2022/9/23</a:t>
             </a:fld>
             <a:endParaRPr lang="zh-CN" altLang="en-US"/>
           </a:p>
@@ -1778,7 +1768,6 @@
           <a:p>
             <a:fld id="{CDF91D2C-8D54-4FB7-92D2-9073743D5A95}" type="slidenum">
               <a:rPr lang="zh-CN" altLang="en-US" smtClean="0"/>
-              <a:pPr/>
               <a:t>‹#›</a:t>
             </a:fld>
             <a:endParaRPr lang="zh-CN" altLang="en-US"/>
@@ -1788,7 +1777,7 @@
     </p:spTree>
     <p:extLst>
       <p:ext uri="{BB962C8B-B14F-4D97-AF65-F5344CB8AC3E}">
-        <p14:creationId xmlns:p14="http://schemas.microsoft.com/office/powerpoint/2010/main" xmlns="" val="1195156568"/>
+        <p14:creationId xmlns:p14="http://schemas.microsoft.com/office/powerpoint/2010/main" val="1195156568"/>
       </p:ext>
     </p:extLst>
   </p:cSld>
@@ -1832,8 +1821,7 @@
           <a:p>
             <a:fld id="{98C2204E-7DD4-40E6-BC6B-54E457881367}" type="datetimeFigureOut">
               <a:rPr lang="zh-CN" altLang="en-US" smtClean="0"/>
-              <a:pPr/>
-              <a:t>2022/9/22</a:t>
+              <a:t>2022/9/23</a:t>
             </a:fld>
             <a:endParaRPr lang="zh-CN" altLang="en-US"/>
           </a:p>
@@ -1875,7 +1863,6 @@
           <a:p>
             <a:fld id="{CDF91D2C-8D54-4FB7-92D2-9073743D5A95}" type="slidenum">
               <a:rPr lang="zh-CN" altLang="en-US" smtClean="0"/>
-              <a:pPr/>
               <a:t>‹#›</a:t>
             </a:fld>
             <a:endParaRPr lang="zh-CN" altLang="en-US"/>
@@ -1885,7 +1872,7 @@
     </p:spTree>
     <p:extLst>
       <p:ext uri="{BB962C8B-B14F-4D97-AF65-F5344CB8AC3E}">
-        <p14:creationId xmlns:p14="http://schemas.microsoft.com/office/powerpoint/2010/main" xmlns="" val="3240486365"/>
+        <p14:creationId xmlns:p14="http://schemas.microsoft.com/office/powerpoint/2010/main" val="3240486365"/>
       </p:ext>
     </p:extLst>
   </p:cSld>
@@ -2111,8 +2098,7 @@
           <a:p>
             <a:fld id="{98C2204E-7DD4-40E6-BC6B-54E457881367}" type="datetimeFigureOut">
               <a:rPr lang="zh-CN" altLang="en-US" smtClean="0"/>
-              <a:pPr/>
-              <a:t>2022/9/22</a:t>
+              <a:t>2022/9/23</a:t>
             </a:fld>
             <a:endParaRPr lang="zh-CN" altLang="en-US"/>
           </a:p>
@@ -2154,7 +2140,6 @@
           <a:p>
             <a:fld id="{CDF91D2C-8D54-4FB7-92D2-9073743D5A95}" type="slidenum">
               <a:rPr lang="zh-CN" altLang="en-US" smtClean="0"/>
-              <a:pPr/>
               <a:t>‹#›</a:t>
             </a:fld>
             <a:endParaRPr lang="zh-CN" altLang="en-US"/>
@@ -2164,7 +2149,7 @@
     </p:spTree>
     <p:extLst>
       <p:ext uri="{BB962C8B-B14F-4D97-AF65-F5344CB8AC3E}">
-        <p14:creationId xmlns:p14="http://schemas.microsoft.com/office/powerpoint/2010/main" xmlns="" val="2317764912"/>
+        <p14:creationId xmlns:p14="http://schemas.microsoft.com/office/powerpoint/2010/main" val="2317764912"/>
       </p:ext>
     </p:extLst>
   </p:cSld>
@@ -2366,8 +2351,7 @@
           <a:p>
             <a:fld id="{98C2204E-7DD4-40E6-BC6B-54E457881367}" type="datetimeFigureOut">
               <a:rPr lang="zh-CN" altLang="en-US" smtClean="0"/>
-              <a:pPr/>
-              <a:t>2022/9/22</a:t>
+              <a:t>2022/9/23</a:t>
             </a:fld>
             <a:endParaRPr lang="zh-CN" altLang="en-US"/>
           </a:p>
@@ -2409,7 +2393,6 @@
           <a:p>
             <a:fld id="{CDF91D2C-8D54-4FB7-92D2-9073743D5A95}" type="slidenum">
               <a:rPr lang="zh-CN" altLang="en-US" smtClean="0"/>
-              <a:pPr/>
               <a:t>‹#›</a:t>
             </a:fld>
             <a:endParaRPr lang="zh-CN" altLang="en-US"/>
@@ -2419,7 +2402,7 @@
     </p:spTree>
     <p:extLst>
       <p:ext uri="{BB962C8B-B14F-4D97-AF65-F5344CB8AC3E}">
-        <p14:creationId xmlns:p14="http://schemas.microsoft.com/office/powerpoint/2010/main" xmlns="" val="4256122531"/>
+        <p14:creationId xmlns:p14="http://schemas.microsoft.com/office/powerpoint/2010/main" val="4256122531"/>
       </p:ext>
     </p:extLst>
   </p:cSld>
@@ -2581,8 +2564,7 @@
           <a:p>
             <a:fld id="{98C2204E-7DD4-40E6-BC6B-54E457881367}" type="datetimeFigureOut">
               <a:rPr lang="zh-CN" altLang="en-US" smtClean="0"/>
-              <a:pPr/>
-              <a:t>2022/9/22</a:t>
+              <a:t>2022/9/23</a:t>
             </a:fld>
             <a:endParaRPr lang="zh-CN" altLang="en-US"/>
           </a:p>
@@ -2660,7 +2642,6 @@
           <a:p>
             <a:fld id="{CDF91D2C-8D54-4FB7-92D2-9073743D5A95}" type="slidenum">
               <a:rPr lang="zh-CN" altLang="en-US" smtClean="0"/>
-              <a:pPr/>
               <a:t>‹#›</a:t>
             </a:fld>
             <a:endParaRPr lang="zh-CN" altLang="en-US"/>
@@ -2670,7 +2651,7 @@
     </p:spTree>
     <p:extLst>
       <p:ext uri="{BB962C8B-B14F-4D97-AF65-F5344CB8AC3E}">
-        <p14:creationId xmlns:p14="http://schemas.microsoft.com/office/powerpoint/2010/main" xmlns="" val="4034558663"/>
+        <p14:creationId xmlns:p14="http://schemas.microsoft.com/office/powerpoint/2010/main" val="4034558663"/>
       </p:ext>
     </p:extLst>
   </p:cSld>
@@ -3000,7 +2981,7 @@
           <a:blip r:embed="rId2" cstate="print">
             <a:extLst>
               <a:ext uri="{28A0092B-C50C-407E-A947-70E740481C1C}">
-                <a14:useLocalDpi xmlns:a14="http://schemas.microsoft.com/office/drawing/2010/main" xmlns="" val="0"/>
+                <a14:useLocalDpi xmlns:a14="http://schemas.microsoft.com/office/drawing/2010/main" val="0"/>
               </a:ext>
             </a:extLst>
           </a:blip>
@@ -3022,7 +3003,7 @@
     </p:spTree>
     <p:extLst>
       <p:ext uri="{BB962C8B-B14F-4D97-AF65-F5344CB8AC3E}">
-        <p14:creationId xmlns:p14="http://schemas.microsoft.com/office/powerpoint/2010/main" xmlns="" val="765811725"/>
+        <p14:creationId xmlns:p14="http://schemas.microsoft.com/office/powerpoint/2010/main" val="765811725"/>
       </p:ext>
     </p:extLst>
   </p:cSld>
@@ -3075,7 +3056,7 @@
     </a:clrScheme>
     <a:fontScheme name="Office">
       <a:majorFont>
-        <a:latin typeface="Calibri Light"/>
+        <a:latin typeface="Calibri Light" panose="020F0302020204030204"/>
         <a:ea typeface=""/>
         <a:cs typeface=""/>
         <a:font script="Jpan" typeface="ＭＳ Ｐゴシック"/>
@@ -3110,7 +3091,7 @@
         <a:font script="Geor" typeface="Sylfaen"/>
       </a:majorFont>
       <a:minorFont>
-        <a:latin typeface="Calibri"/>
+        <a:latin typeface="Calibri" panose="020F0502020204030204"/>
         <a:ea typeface=""/>
         <a:cs typeface=""/>
         <a:font script="Jpan" typeface="ＭＳ Ｐゴシック"/>
@@ -3287,7 +3268,7 @@
   <a:extraClrSchemeLst/>
   <a:extLst>
     <a:ext uri="{05A4C25C-085E-4340-85A3-A5531E510DB2}">
-      <thm15:themeFamily xmlns:thm15="http://schemas.microsoft.com/office/thememl/2012/main" xmlns="" name="Office Theme" id="{62F939B6-93AF-4DB8-9C6B-D6C7DFDC589F}" vid="{4A3C46E8-61CC-4603-A589-7422A47A8E4A}"/>
+      <thm15:themeFamily xmlns:thm15="http://schemas.microsoft.com/office/thememl/2012/main" name="Office Theme" id="{62F939B6-93AF-4DB8-9C6B-D6C7DFDC589F}" vid="{4A3C46E8-61CC-4603-A589-7422A47A8E4A}"/>
     </a:ext>
   </a:extLst>
 </a:theme>

</xml_diff>